<commit_message>
Added extensive comments to exponential_steps.py
</commit_message>
<xml_diff>
--- a/Update Meeting.pptx
+++ b/Update Meeting.pptx
@@ -132,8 +132,7 @@
 <file path=ppt/revisionInfo.xml><?xml version="1.0" encoding="utf-8"?>
 <p1510:revInfo xmlns:a="http://schemas.openxmlformats.org/drawingml/2006/main" xmlns:r="http://schemas.openxmlformats.org/officeDocument/2006/relationships" xmlns:p1510="http://schemas.microsoft.com/office/powerpoint/2015/10/main">
   <p1510:revLst>
-    <p1510:client id="{7D47ED93-4E69-4B81-ABD4-DB28384AA08A}" v="28" dt="2025-06-10T20:14:18.957"/>
-    <p1510:client id="{DFB0F0DC-DB6D-4F95-B181-2346509E62EC}" v="2" dt="2025-06-11T14:15:16.079"/>
+    <p1510:client id="{4C131903-AD5D-4C5E-879C-D08FDA4120A9}" v="5" dt="2025-06-17T10:00:59.249"/>
   </p1510:revLst>
 </p1510:revInfo>
 </file>
@@ -2085,6 +2084,94 @@
             <ac:spMk id="3" creationId="{3B03112A-A25A-6656-2230-0490CEC3BA1A}"/>
           </ac:spMkLst>
         </pc:spChg>
+      </pc:sldChg>
+    </pc:docChg>
+  </pc:docChgLst>
+  <pc:docChgLst>
+    <pc:chgData name="Jarod van Otegem" userId="40a590013f178374" providerId="LiveId" clId="{4C131903-AD5D-4C5E-879C-D08FDA4120A9}"/>
+    <pc:docChg chg="custSel modSld">
+      <pc:chgData name="Jarod van Otegem" userId="40a590013f178374" providerId="LiveId" clId="{4C131903-AD5D-4C5E-879C-D08FDA4120A9}" dt="2025-06-17T10:19:10.229" v="86" actId="1076"/>
+      <pc:docMkLst>
+        <pc:docMk/>
+      </pc:docMkLst>
+      <pc:sldChg chg="addSp delSp modSp mod">
+        <pc:chgData name="Jarod van Otegem" userId="40a590013f178374" providerId="LiveId" clId="{4C131903-AD5D-4C5E-879C-D08FDA4120A9}" dt="2025-06-17T10:19:10.229" v="86" actId="1076"/>
+        <pc:sldMkLst>
+          <pc:docMk/>
+          <pc:sldMk cId="1529055336" sldId="257"/>
+        </pc:sldMkLst>
+        <pc:spChg chg="add mod">
+          <ac:chgData name="Jarod van Otegem" userId="40a590013f178374" providerId="LiveId" clId="{4C131903-AD5D-4C5E-879C-D08FDA4120A9}" dt="2025-06-17T10:19:10.229" v="86" actId="1076"/>
+          <ac:spMkLst>
+            <pc:docMk/>
+            <pc:sldMk cId="1529055336" sldId="257"/>
+            <ac:spMk id="13" creationId="{CE30F3CC-5DB3-1393-F72B-A608B28709F5}"/>
+          </ac:spMkLst>
+        </pc:spChg>
+        <pc:spChg chg="add del mod">
+          <ac:chgData name="Jarod van Otegem" userId="40a590013f178374" providerId="LiveId" clId="{4C131903-AD5D-4C5E-879C-D08FDA4120A9}" dt="2025-06-17T10:01:31.342" v="52" actId="478"/>
+          <ac:spMkLst>
+            <pc:docMk/>
+            <pc:sldMk cId="1529055336" sldId="257"/>
+            <ac:spMk id="17" creationId="{2BFB7CF1-A66F-279C-2CCD-3E33C70CDF5B}"/>
+          </ac:spMkLst>
+        </pc:spChg>
+        <pc:spChg chg="add mod">
+          <ac:chgData name="Jarod van Otegem" userId="40a590013f178374" providerId="LiveId" clId="{4C131903-AD5D-4C5E-879C-D08FDA4120A9}" dt="2025-06-17T10:02:05.916" v="72" actId="20577"/>
+          <ac:spMkLst>
+            <pc:docMk/>
+            <pc:sldMk cId="1529055336" sldId="257"/>
+            <ac:spMk id="18" creationId="{A09B0AF0-EAA5-C6A1-26C4-47E27B078ABB}"/>
+          </ac:spMkLst>
+        </pc:spChg>
+        <pc:spChg chg="mod">
+          <ac:chgData name="Jarod van Otegem" userId="40a590013f178374" providerId="LiveId" clId="{4C131903-AD5D-4C5E-879C-D08FDA4120A9}" dt="2025-06-17T10:02:08.125" v="73" actId="20577"/>
+          <ac:spMkLst>
+            <pc:docMk/>
+            <pc:sldMk cId="1529055336" sldId="257"/>
+            <ac:spMk id="26" creationId="{EE5BF080-3F74-BB4A-525C-99BD836F24F9}"/>
+          </ac:spMkLst>
+        </pc:spChg>
+        <pc:spChg chg="del mod">
+          <ac:chgData name="Jarod van Otegem" userId="40a590013f178374" providerId="LiveId" clId="{4C131903-AD5D-4C5E-879C-D08FDA4120A9}" dt="2025-06-17T09:31:28.877" v="1" actId="478"/>
+          <ac:spMkLst>
+            <pc:docMk/>
+            <pc:sldMk cId="1529055336" sldId="257"/>
+            <ac:spMk id="63" creationId="{1ECB81C3-B322-765F-ABE0-A76E23FC6D67}"/>
+          </ac:spMkLst>
+        </pc:spChg>
+        <pc:cxnChg chg="add mod">
+          <ac:chgData name="Jarod van Otegem" userId="40a590013f178374" providerId="LiveId" clId="{4C131903-AD5D-4C5E-879C-D08FDA4120A9}" dt="2025-06-17T10:01:52.080" v="57" actId="14100"/>
+          <ac:cxnSpMkLst>
+            <pc:docMk/>
+            <pc:sldMk cId="1529055336" sldId="257"/>
+            <ac:cxnSpMk id="2" creationId="{7DFFA013-FC7A-0C92-9F6F-826CEDEE4CA4}"/>
+          </ac:cxnSpMkLst>
+        </pc:cxnChg>
+        <pc:cxnChg chg="add mod">
+          <ac:chgData name="Jarod van Otegem" userId="40a590013f178374" providerId="LiveId" clId="{4C131903-AD5D-4C5E-879C-D08FDA4120A9}" dt="2025-06-17T10:01:43.881" v="55" actId="14100"/>
+          <ac:cxnSpMkLst>
+            <pc:docMk/>
+            <pc:sldMk cId="1529055336" sldId="257"/>
+            <ac:cxnSpMk id="10" creationId="{2B7A7EE4-E0ED-DC0E-5AA0-FDAC2BC1345D}"/>
+          </ac:cxnSpMkLst>
+        </pc:cxnChg>
+        <pc:cxnChg chg="add mod">
+          <ac:chgData name="Jarod van Otegem" userId="40a590013f178374" providerId="LiveId" clId="{4C131903-AD5D-4C5E-879C-D08FDA4120A9}" dt="2025-06-17T10:02:30.598" v="77" actId="14100"/>
+          <ac:cxnSpMkLst>
+            <pc:docMk/>
+            <pc:sldMk cId="1529055336" sldId="257"/>
+            <ac:cxnSpMk id="22" creationId="{0A88E4D2-797F-B77B-5EAB-06730B242BBD}"/>
+          </ac:cxnSpMkLst>
+        </pc:cxnChg>
+        <pc:cxnChg chg="mod">
+          <ac:chgData name="Jarod van Otegem" userId="40a590013f178374" providerId="LiveId" clId="{4C131903-AD5D-4C5E-879C-D08FDA4120A9}" dt="2025-06-17T10:02:40.756" v="78" actId="14100"/>
+          <ac:cxnSpMkLst>
+            <pc:docMk/>
+            <pc:sldMk cId="1529055336" sldId="257"/>
+            <ac:cxnSpMk id="39" creationId="{2ABE2AE0-A7E3-FBB3-F53D-36CFF89A2E1F}"/>
+          </ac:cxnSpMkLst>
+        </pc:cxnChg>
       </pc:sldChg>
     </pc:docChg>
   </pc:docChgLst>
@@ -2240,7 +2327,7 @@
           <a:p>
             <a:fld id="{46451311-CBD5-4883-8E4F-1218AF6F0A1C}" type="datetimeFigureOut">
               <a:rPr lang="en-NL" smtClean="0"/>
-              <a:t>11/06/2025</a:t>
+              <a:t>17/06/2025</a:t>
             </a:fld>
             <a:endParaRPr lang="en-NL"/>
           </a:p>
@@ -2440,7 +2527,7 @@
           <a:p>
             <a:fld id="{46451311-CBD5-4883-8E4F-1218AF6F0A1C}" type="datetimeFigureOut">
               <a:rPr lang="en-NL" smtClean="0"/>
-              <a:t>11/06/2025</a:t>
+              <a:t>17/06/2025</a:t>
             </a:fld>
             <a:endParaRPr lang="en-NL"/>
           </a:p>
@@ -2650,7 +2737,7 @@
           <a:p>
             <a:fld id="{46451311-CBD5-4883-8E4F-1218AF6F0A1C}" type="datetimeFigureOut">
               <a:rPr lang="en-NL" smtClean="0"/>
-              <a:t>11/06/2025</a:t>
+              <a:t>17/06/2025</a:t>
             </a:fld>
             <a:endParaRPr lang="en-NL"/>
           </a:p>
@@ -2850,7 +2937,7 @@
           <a:p>
             <a:fld id="{46451311-CBD5-4883-8E4F-1218AF6F0A1C}" type="datetimeFigureOut">
               <a:rPr lang="en-NL" smtClean="0"/>
-              <a:t>11/06/2025</a:t>
+              <a:t>17/06/2025</a:t>
             </a:fld>
             <a:endParaRPr lang="en-NL"/>
           </a:p>
@@ -3126,7 +3213,7 @@
           <a:p>
             <a:fld id="{46451311-CBD5-4883-8E4F-1218AF6F0A1C}" type="datetimeFigureOut">
               <a:rPr lang="en-NL" smtClean="0"/>
-              <a:t>11/06/2025</a:t>
+              <a:t>17/06/2025</a:t>
             </a:fld>
             <a:endParaRPr lang="en-NL"/>
           </a:p>
@@ -3394,7 +3481,7 @@
           <a:p>
             <a:fld id="{46451311-CBD5-4883-8E4F-1218AF6F0A1C}" type="datetimeFigureOut">
               <a:rPr lang="en-NL" smtClean="0"/>
-              <a:t>11/06/2025</a:t>
+              <a:t>17/06/2025</a:t>
             </a:fld>
             <a:endParaRPr lang="en-NL"/>
           </a:p>
@@ -3809,7 +3896,7 @@
           <a:p>
             <a:fld id="{46451311-CBD5-4883-8E4F-1218AF6F0A1C}" type="datetimeFigureOut">
               <a:rPr lang="en-NL" smtClean="0"/>
-              <a:t>11/06/2025</a:t>
+              <a:t>17/06/2025</a:t>
             </a:fld>
             <a:endParaRPr lang="en-NL"/>
           </a:p>
@@ -3951,7 +4038,7 @@
           <a:p>
             <a:fld id="{46451311-CBD5-4883-8E4F-1218AF6F0A1C}" type="datetimeFigureOut">
               <a:rPr lang="en-NL" smtClean="0"/>
-              <a:t>11/06/2025</a:t>
+              <a:t>17/06/2025</a:t>
             </a:fld>
             <a:endParaRPr lang="en-NL"/>
           </a:p>
@@ -4064,7 +4151,7 @@
           <a:p>
             <a:fld id="{46451311-CBD5-4883-8E4F-1218AF6F0A1C}" type="datetimeFigureOut">
               <a:rPr lang="en-NL" smtClean="0"/>
-              <a:t>11/06/2025</a:t>
+              <a:t>17/06/2025</a:t>
             </a:fld>
             <a:endParaRPr lang="en-NL"/>
           </a:p>
@@ -4377,7 +4464,7 @@
           <a:p>
             <a:fld id="{46451311-CBD5-4883-8E4F-1218AF6F0A1C}" type="datetimeFigureOut">
               <a:rPr lang="en-NL" smtClean="0"/>
-              <a:t>11/06/2025</a:t>
+              <a:t>17/06/2025</a:t>
             </a:fld>
             <a:endParaRPr lang="en-NL"/>
           </a:p>
@@ -4666,7 +4753,7 @@
           <a:p>
             <a:fld id="{46451311-CBD5-4883-8E4F-1218AF6F0A1C}" type="datetimeFigureOut">
               <a:rPr lang="en-NL" smtClean="0"/>
-              <a:t>11/06/2025</a:t>
+              <a:t>17/06/2025</a:t>
             </a:fld>
             <a:endParaRPr lang="en-NL"/>
           </a:p>
@@ -4909,7 +4996,7 @@
           <a:p>
             <a:fld id="{46451311-CBD5-4883-8E4F-1218AF6F0A1C}" type="datetimeFigureOut">
               <a:rPr lang="en-NL" smtClean="0"/>
-              <a:t>11/06/2025</a:t>
+              <a:t>17/06/2025</a:t>
             </a:fld>
             <a:endParaRPr lang="en-NL"/>
           </a:p>
@@ -12029,7 +12116,7 @@
               <a:rPr lang="en-US" dirty="0" err="1"/>
               <a:t>WorkerThread</a:t>
             </a:r>
-            <a:endParaRPr lang="en-NL" dirty="0"/>
+            <a:endParaRPr lang="en-US" dirty="0"/>
           </a:p>
         </p:txBody>
       </p:sp>
@@ -12308,20 +12395,17 @@
           </p:cNvPr>
           <p:cNvCxnSpPr>
             <a:cxnSpLocks/>
-            <a:stCxn id="37" idx="3"/>
-            <a:endCxn id="26" idx="3"/>
+            <a:stCxn id="37" idx="1"/>
           </p:cNvCxnSpPr>
           <p:nvPr/>
         </p:nvCxnSpPr>
         <p:spPr>
-          <a:xfrm flipH="1" flipV="1">
-            <a:off x="8715503" y="1680950"/>
-            <a:ext cx="544285" cy="3178461"/>
-          </a:xfrm>
-          <a:prstGeom prst="bentConnector3">
-            <a:avLst>
-              <a:gd name="adj1" fmla="val -25790"/>
-            </a:avLst>
+          <a:xfrm rot="10800000">
+            <a:off x="7086388" y="2334093"/>
+            <a:ext cx="112373" cy="2525318"/>
+          </a:xfrm>
+          <a:prstGeom prst="bentConnector2">
+            <a:avLst/>
           </a:prstGeom>
         </p:spPr>
         <p:style>
@@ -12432,42 +12516,6 @@
       </p:cxnSp>
       <p:sp>
         <p:nvSpPr>
-          <p:cNvPr id="63" name="TextBox 62">
-            <a:extLst>
-              <a:ext uri="{FF2B5EF4-FFF2-40B4-BE49-F238E27FC236}">
-                <a16:creationId xmlns:a16="http://schemas.microsoft.com/office/drawing/2014/main" id="{1ECB81C3-B322-765F-ABE0-A76E23FC6D67}"/>
-              </a:ext>
-            </a:extLst>
-          </p:cNvPr>
-          <p:cNvSpPr txBox="1"/>
-          <p:nvPr/>
-        </p:nvSpPr>
-        <p:spPr>
-          <a:xfrm>
-            <a:off x="122830" y="162303"/>
-            <a:ext cx="5740618" cy="646331"/>
-          </a:xfrm>
-          <a:prstGeom prst="rect">
-            <a:avLst/>
-          </a:prstGeom>
-          <a:noFill/>
-        </p:spPr>
-        <p:txBody>
-          <a:bodyPr wrap="square" rtlCol="0">
-            <a:spAutoFit/>
-          </a:bodyPr>
-          <a:lstStyle/>
-          <a:p>
-            <a:r>
-              <a:rPr lang="en-US" sz="3600" dirty="0"/>
-              <a:t>File Chart</a:t>
-            </a:r>
-            <a:endParaRPr lang="en-NL" sz="3600" dirty="0"/>
-          </a:p>
-        </p:txBody>
-      </p:sp>
-      <p:sp>
-        <p:nvSpPr>
           <p:cNvPr id="70" name="TextBox 69">
             <a:extLst>
               <a:ext uri="{FF2B5EF4-FFF2-40B4-BE49-F238E27FC236}">
@@ -12607,6 +12655,221 @@
           </a:xfrm>
           <a:prstGeom prst="line">
             <a:avLst/>
+          </a:prstGeom>
+        </p:spPr>
+        <p:style>
+          <a:lnRef idx="2">
+            <a:schemeClr val="dk1"/>
+          </a:lnRef>
+          <a:fillRef idx="0">
+            <a:schemeClr val="dk1"/>
+          </a:fillRef>
+          <a:effectRef idx="1">
+            <a:schemeClr val="dk1"/>
+          </a:effectRef>
+          <a:fontRef idx="minor">
+            <a:schemeClr val="tx1"/>
+          </a:fontRef>
+        </p:style>
+      </p:cxnSp>
+      <p:cxnSp>
+        <p:nvCxnSpPr>
+          <p:cNvPr id="2" name="Straight Arrow Connector 1">
+            <a:extLst>
+              <a:ext uri="{FF2B5EF4-FFF2-40B4-BE49-F238E27FC236}">
+                <a16:creationId xmlns:a16="http://schemas.microsoft.com/office/drawing/2014/main" id="{7DFFA013-FC7A-0C92-9F6F-826CEDEE4CA4}"/>
+              </a:ext>
+            </a:extLst>
+          </p:cNvPr>
+          <p:cNvCxnSpPr>
+            <a:cxnSpLocks/>
+            <a:stCxn id="7" idx="2"/>
+            <a:endCxn id="18" idx="1"/>
+          </p:cNvCxnSpPr>
+          <p:nvPr/>
+        </p:nvCxnSpPr>
+        <p:spPr>
+          <a:xfrm>
+            <a:off x="5863448" y="3961260"/>
+            <a:ext cx="1335312" cy="2130325"/>
+          </a:xfrm>
+          <a:prstGeom prst="straightConnector1">
+            <a:avLst/>
+          </a:prstGeom>
+          <a:ln>
+            <a:prstDash val="dash"/>
+            <a:headEnd type="triangle"/>
+            <a:tailEnd type="triangle"/>
+          </a:ln>
+        </p:spPr>
+        <p:style>
+          <a:lnRef idx="2">
+            <a:schemeClr val="dk1"/>
+          </a:lnRef>
+          <a:fillRef idx="0">
+            <a:schemeClr val="dk1"/>
+          </a:fillRef>
+          <a:effectRef idx="1">
+            <a:schemeClr val="dk1"/>
+          </a:effectRef>
+          <a:fontRef idx="minor">
+            <a:schemeClr val="tx1"/>
+          </a:fontRef>
+        </p:style>
+      </p:cxnSp>
+      <p:cxnSp>
+        <p:nvCxnSpPr>
+          <p:cNvPr id="10" name="Straight Arrow Connector 9">
+            <a:extLst>
+              <a:ext uri="{FF2B5EF4-FFF2-40B4-BE49-F238E27FC236}">
+                <a16:creationId xmlns:a16="http://schemas.microsoft.com/office/drawing/2014/main" id="{2B7A7EE4-E0ED-DC0E-5AA0-FDAC2BC1345D}"/>
+              </a:ext>
+            </a:extLst>
+          </p:cNvPr>
+          <p:cNvCxnSpPr>
+            <a:cxnSpLocks/>
+            <a:endCxn id="18" idx="1"/>
+          </p:cNvCxnSpPr>
+          <p:nvPr/>
+        </p:nvCxnSpPr>
+        <p:spPr>
+          <a:xfrm>
+            <a:off x="4311600" y="3961259"/>
+            <a:ext cx="2887160" cy="2130326"/>
+          </a:xfrm>
+          <a:prstGeom prst="straightConnector1">
+            <a:avLst/>
+          </a:prstGeom>
+          <a:ln>
+            <a:prstDash val="dash"/>
+            <a:headEnd type="triangle"/>
+            <a:tailEnd type="triangle"/>
+          </a:ln>
+        </p:spPr>
+        <p:style>
+          <a:lnRef idx="2">
+            <a:schemeClr val="dk1"/>
+          </a:lnRef>
+          <a:fillRef idx="0">
+            <a:schemeClr val="dk1"/>
+          </a:fillRef>
+          <a:effectRef idx="1">
+            <a:schemeClr val="dk1"/>
+          </a:effectRef>
+          <a:fontRef idx="minor">
+            <a:schemeClr val="tx1"/>
+          </a:fontRef>
+        </p:style>
+      </p:cxnSp>
+      <p:sp>
+        <p:nvSpPr>
+          <p:cNvPr id="13" name="TextBox 12">
+            <a:extLst>
+              <a:ext uri="{FF2B5EF4-FFF2-40B4-BE49-F238E27FC236}">
+                <a16:creationId xmlns:a16="http://schemas.microsoft.com/office/drawing/2014/main" id="{CE30F3CC-5DB3-1393-F72B-A608B28709F5}"/>
+              </a:ext>
+            </a:extLst>
+          </p:cNvPr>
+          <p:cNvSpPr txBox="1"/>
+          <p:nvPr/>
+        </p:nvSpPr>
+        <p:spPr>
+          <a:xfrm rot="2447605">
+            <a:off x="5739029" y="5177221"/>
+            <a:ext cx="1599492" cy="369332"/>
+          </a:xfrm>
+          <a:prstGeom prst="rect">
+            <a:avLst/>
+          </a:prstGeom>
+          <a:noFill/>
+        </p:spPr>
+        <p:txBody>
+          <a:bodyPr wrap="square" rtlCol="0">
+            <a:spAutoFit/>
+          </a:bodyPr>
+          <a:lstStyle/>
+          <a:p>
+            <a:r>
+              <a:rPr lang="en-US" dirty="0"/>
+              <a:t>Signals</a:t>
+            </a:r>
+            <a:endParaRPr lang="en-NL" dirty="0"/>
+          </a:p>
+        </p:txBody>
+      </p:sp>
+      <p:sp>
+        <p:nvSpPr>
+          <p:cNvPr id="18" name="Rectangle 17">
+            <a:extLst>
+              <a:ext uri="{FF2B5EF4-FFF2-40B4-BE49-F238E27FC236}">
+                <a16:creationId xmlns:a16="http://schemas.microsoft.com/office/drawing/2014/main" id="{A09B0AF0-EAA5-C6A1-26C4-47E27B078ABB}"/>
+              </a:ext>
+            </a:extLst>
+          </p:cNvPr>
+          <p:cNvSpPr/>
+          <p:nvPr/>
+        </p:nvSpPr>
+        <p:spPr>
+          <a:xfrm>
+            <a:off x="7198760" y="5651744"/>
+            <a:ext cx="2061028" cy="879681"/>
+          </a:xfrm>
+          <a:prstGeom prst="rect">
+            <a:avLst/>
+          </a:prstGeom>
+        </p:spPr>
+        <p:style>
+          <a:lnRef idx="2">
+            <a:schemeClr val="dk1"/>
+          </a:lnRef>
+          <a:fillRef idx="1">
+            <a:schemeClr val="lt1"/>
+          </a:fillRef>
+          <a:effectRef idx="0">
+            <a:schemeClr val="dk1"/>
+          </a:effectRef>
+          <a:fontRef idx="minor">
+            <a:schemeClr val="dk1"/>
+          </a:fontRef>
+        </p:style>
+        <p:txBody>
+          <a:bodyPr rtlCol="0" anchor="ctr"/>
+          <a:lstStyle/>
+          <a:p>
+            <a:pPr algn="ctr"/>
+            <a:r>
+              <a:rPr lang="en-US" dirty="0" err="1"/>
+              <a:t>GraphThread</a:t>
+            </a:r>
+            <a:endParaRPr lang="en-NL" dirty="0"/>
+          </a:p>
+        </p:txBody>
+      </p:sp>
+      <p:cxnSp>
+        <p:nvCxnSpPr>
+          <p:cNvPr id="22" name="Connector: Elbow 21">
+            <a:extLst>
+              <a:ext uri="{FF2B5EF4-FFF2-40B4-BE49-F238E27FC236}">
+                <a16:creationId xmlns:a16="http://schemas.microsoft.com/office/drawing/2014/main" id="{0A88E4D2-797F-B77B-5EAB-06730B242BBD}"/>
+              </a:ext>
+            </a:extLst>
+          </p:cNvPr>
+          <p:cNvCxnSpPr>
+            <a:cxnSpLocks/>
+            <a:stCxn id="26" idx="3"/>
+            <a:endCxn id="18" idx="3"/>
+          </p:cNvCxnSpPr>
+          <p:nvPr/>
+        </p:nvCxnSpPr>
+        <p:spPr>
+          <a:xfrm>
+            <a:off x="8715503" y="1680950"/>
+            <a:ext cx="544285" cy="4410635"/>
+          </a:xfrm>
+          <a:prstGeom prst="bentConnector3">
+            <a:avLst>
+              <a:gd name="adj1" fmla="val 142000"/>
+            </a:avLst>
           </a:prstGeom>
         </p:spPr>
         <p:style>

</xml_diff>